<commit_message>
final update for powerpoint
down to 32 slides
</commit_message>
<xml_diff>
--- a/defense presentation.pptx
+++ b/defense presentation.pptx
@@ -5,7 +5,7 @@
     <p:sldMasterId id="2147483743" r:id="rId1"/>
   </p:sldMasterIdLst>
   <p:notesMasterIdLst>
-    <p:notesMasterId r:id="rId35"/>
+    <p:notesMasterId r:id="rId34"/>
   </p:notesMasterIdLst>
   <p:sldIdLst>
     <p:sldId id="256" r:id="rId2"/>
@@ -32,15 +32,14 @@
     <p:sldId id="334" r:id="rId23"/>
     <p:sldId id="333" r:id="rId24"/>
     <p:sldId id="307" r:id="rId25"/>
-    <p:sldId id="308" r:id="rId26"/>
-    <p:sldId id="317" r:id="rId27"/>
-    <p:sldId id="345" r:id="rId28"/>
-    <p:sldId id="341" r:id="rId29"/>
-    <p:sldId id="327" r:id="rId30"/>
-    <p:sldId id="339" r:id="rId31"/>
-    <p:sldId id="309" r:id="rId32"/>
-    <p:sldId id="340" r:id="rId33"/>
-    <p:sldId id="342" r:id="rId34"/>
+    <p:sldId id="317" r:id="rId26"/>
+    <p:sldId id="345" r:id="rId27"/>
+    <p:sldId id="341" r:id="rId28"/>
+    <p:sldId id="327" r:id="rId29"/>
+    <p:sldId id="339" r:id="rId30"/>
+    <p:sldId id="309" r:id="rId31"/>
+    <p:sldId id="340" r:id="rId32"/>
+    <p:sldId id="342" r:id="rId33"/>
   </p:sldIdLst>
   <p:sldSz cx="12192000" cy="6858000"/>
   <p:notesSz cx="6858000" cy="9144000"/>
@@ -16817,13 +16816,13 @@
           <p:nvPr>
             <p:extLst>
               <p:ext uri="{D42A27DB-BD31-4B8C-83A1-F6EECF244321}">
-                <p14:modId xmlns:p14="http://schemas.microsoft.com/office/powerpoint/2010/main" val="1004646220"/>
+                <p14:modId xmlns:p14="http://schemas.microsoft.com/office/powerpoint/2010/main" val="580954679"/>
               </p:ext>
             </p:extLst>
           </p:nvPr>
         </p:nvGraphicFramePr>
         <p:xfrm>
-          <a:off x="6262108" y="3240353"/>
+          <a:off x="106007" y="3278990"/>
           <a:ext cx="5768080" cy="2412770"/>
         </p:xfrm>
         <a:graphic>
@@ -16954,7 +16953,7 @@
                             <a:schemeClr val="tx1"/>
                           </a:solidFill>
                         </a:rPr>
-                        <a:t>z</a:t>
+                        <a:t>t</a:t>
                       </a:r>
                     </a:p>
                   </a:txBody>
@@ -17632,7 +17631,7 @@
                           <a:ea typeface="Calibri" panose="020F0502020204030204" pitchFamily="34" charset="0"/>
                           <a:cs typeface="Times New Roman" panose="02020603050405020304" pitchFamily="18" charset="0"/>
                         </a:rPr>
-                        <a:t>-22.464</a:t>
+                        <a:t>.193</a:t>
                       </a:r>
                       <a:endParaRPr lang="en-US" sz="1800" dirty="0">
                         <a:effectLst/>
@@ -17671,7 +17670,7 @@
                           <a:ea typeface="Calibri" panose="020F0502020204030204" pitchFamily="34" charset="0"/>
                           <a:cs typeface="Times New Roman" panose="02020603050405020304" pitchFamily="18" charset="0"/>
                         </a:rPr>
-                        <a:t>3.671</a:t>
+                        <a:t>.410</a:t>
                       </a:r>
                       <a:endParaRPr lang="en-US" sz="1800" dirty="0">
                         <a:effectLst/>
@@ -17710,7 +17709,7 @@
                           <a:ea typeface="Calibri" panose="020F0502020204030204" pitchFamily="34" charset="0"/>
                           <a:cs typeface="Times New Roman" panose="02020603050405020304" pitchFamily="18" charset="0"/>
                         </a:rPr>
-                        <a:t>-6.119</a:t>
+                        <a:t>.471</a:t>
                       </a:r>
                       <a:endParaRPr lang="en-US" sz="1800" dirty="0">
                         <a:effectLst/>
@@ -17749,7 +17748,7 @@
                           <a:ea typeface="Calibri" panose="020F0502020204030204" pitchFamily="34" charset="0"/>
                           <a:cs typeface="Times New Roman" panose="02020603050405020304" pitchFamily="18" charset="0"/>
                         </a:rPr>
-                        <a:t>&lt; .001</a:t>
+                        <a:t>.638</a:t>
                       </a:r>
                       <a:endParaRPr lang="en-US" sz="1800" dirty="0">
                         <a:effectLst/>
@@ -17790,13 +17789,13 @@
           <p:nvPr>
             <p:extLst>
               <p:ext uri="{D42A27DB-BD31-4B8C-83A1-F6EECF244321}">
-                <p14:modId xmlns:p14="http://schemas.microsoft.com/office/powerpoint/2010/main" val="2469233811"/>
+                <p14:modId xmlns:p14="http://schemas.microsoft.com/office/powerpoint/2010/main" val="909264146"/>
               </p:ext>
             </p:extLst>
           </p:nvPr>
         </p:nvGraphicFramePr>
         <p:xfrm>
-          <a:off x="161814" y="3234738"/>
+          <a:off x="6096000" y="3278991"/>
           <a:ext cx="5768080" cy="2412769"/>
         </p:xfrm>
         <a:graphic>
@@ -17927,7 +17926,7 @@
                             <a:schemeClr val="tx1"/>
                           </a:solidFill>
                         </a:rPr>
-                        <a:t>t</a:t>
+                        <a:t>z</a:t>
                       </a:r>
                     </a:p>
                   </a:txBody>
@@ -18637,7 +18636,7 @@
                           <a:ea typeface="Calibri" panose="020F0502020204030204" pitchFamily="34" charset="0"/>
                           <a:cs typeface="Times New Roman" panose="02020603050405020304" pitchFamily="18" charset="0"/>
                         </a:rPr>
-                        <a:t>.193</a:t>
+                        <a:t>-22.464</a:t>
                       </a:r>
                       <a:endParaRPr lang="en-US" sz="1800" dirty="0">
                         <a:effectLst/>
@@ -18676,7 +18675,7 @@
                           <a:ea typeface="Calibri" panose="020F0502020204030204" pitchFamily="34" charset="0"/>
                           <a:cs typeface="Times New Roman" panose="02020603050405020304" pitchFamily="18" charset="0"/>
                         </a:rPr>
-                        <a:t>.410</a:t>
+                        <a:t>3.671</a:t>
                       </a:r>
                       <a:endParaRPr lang="en-US" sz="1800" dirty="0">
                         <a:effectLst/>
@@ -18715,7 +18714,7 @@
                           <a:ea typeface="Calibri" panose="020F0502020204030204" pitchFamily="34" charset="0"/>
                           <a:cs typeface="Times New Roman" panose="02020603050405020304" pitchFamily="18" charset="0"/>
                         </a:rPr>
-                        <a:t>.471</a:t>
+                        <a:t>-6.119</a:t>
                       </a:r>
                       <a:endParaRPr lang="en-US" sz="1800" dirty="0">
                         <a:effectLst/>
@@ -18754,7 +18753,7 @@
                           <a:ea typeface="Calibri" panose="020F0502020204030204" pitchFamily="34" charset="0"/>
                           <a:cs typeface="Times New Roman" panose="02020603050405020304" pitchFamily="18" charset="0"/>
                         </a:rPr>
-                        <a:t>.638</a:t>
+                        <a:t>&lt; .001</a:t>
                       </a:r>
                       <a:endParaRPr lang="en-US" sz="1800" dirty="0">
                         <a:effectLst/>
@@ -18831,7 +18830,7 @@
         </p:nvSpPr>
         <p:spPr>
           <a:xfrm>
-            <a:off x="7349544" y="2656663"/>
+            <a:off x="7053330" y="2656663"/>
             <a:ext cx="4159876" cy="461665"/>
           </a:xfrm>
           <a:prstGeom prst="rect">
@@ -18851,46 +18850,6 @@
               <a:t>Recall</a:t>
             </a:r>
             <a:endParaRPr lang="en-US" b="1" dirty="0"/>
-          </a:p>
-        </p:txBody>
-      </p:sp>
-      <p:sp>
-        <p:nvSpPr>
-          <p:cNvPr id="3" name="TextBox 2">
-            <a:extLst>
-              <a:ext uri="{FF2B5EF4-FFF2-40B4-BE49-F238E27FC236}">
-                <a16:creationId xmlns:a16="http://schemas.microsoft.com/office/drawing/2014/main" id="{6CE9EB2D-4797-47C7-A56C-D03D0599A47D}"/>
-              </a:ext>
-            </a:extLst>
-          </p:cNvPr>
-          <p:cNvSpPr txBox="1"/>
-          <p:nvPr/>
-        </p:nvSpPr>
-        <p:spPr>
-          <a:xfrm>
-            <a:off x="4842456" y="2114117"/>
-            <a:ext cx="3397385" cy="646331"/>
-          </a:xfrm>
-          <a:prstGeom prst="rect">
-            <a:avLst/>
-          </a:prstGeom>
-          <a:noFill/>
-        </p:spPr>
-        <p:txBody>
-          <a:bodyPr wrap="square" rtlCol="0">
-            <a:spAutoFit/>
-          </a:bodyPr>
-          <a:lstStyle/>
-          <a:p>
-            <a:r>
-              <a:rPr lang="en-US" sz="3600" dirty="0">
-                <a:latin typeface="Calibri Light" panose="020F0302020204030204"/>
-                <a:ea typeface="+mj-ea"/>
-                <a:cs typeface="+mj-cs"/>
-              </a:rPr>
-              <a:t>Main Effects</a:t>
-            </a:r>
-            <a:endParaRPr lang="en-US" dirty="0"/>
           </a:p>
         </p:txBody>
       </p:sp>
@@ -30465,150 +30424,7 @@
           <a:p>
             <a:r>
               <a:rPr lang="en-US" dirty="0"/>
-              <a:t>Summary – Experiment One</a:t>
-            </a:r>
-          </a:p>
-        </p:txBody>
-      </p:sp>
-      <p:sp>
-        <p:nvSpPr>
-          <p:cNvPr id="3" name="Content Placeholder 2">
-            <a:extLst>
-              <a:ext uri="{FF2B5EF4-FFF2-40B4-BE49-F238E27FC236}">
-                <a16:creationId xmlns:a16="http://schemas.microsoft.com/office/drawing/2014/main" id="{2995F90E-C290-458D-BBB4-620AC6439465}"/>
-              </a:ext>
-            </a:extLst>
-          </p:cNvPr>
-          <p:cNvSpPr>
-            <a:spLocks noGrp="1"/>
-          </p:cNvSpPr>
-          <p:nvPr>
-            <p:ph idx="1"/>
-          </p:nvPr>
-        </p:nvSpPr>
-        <p:spPr>
-          <a:xfrm>
-            <a:off x="1154954" y="2603500"/>
-            <a:ext cx="9019356" cy="3728720"/>
-          </a:xfrm>
-        </p:spPr>
-        <p:txBody>
-          <a:bodyPr>
-            <a:normAutofit/>
-          </a:bodyPr>
-          <a:lstStyle/>
-          <a:p>
-            <a:r>
-              <a:rPr lang="en-US" sz="2200" dirty="0">
-                <a:solidFill>
-                  <a:schemeClr val="tx1"/>
-                </a:solidFill>
-              </a:rPr>
-              <a:t>Experiment One investigated the relationship between associative, semantic, and thematic word relations and their eﬀect on participant judgments and recall performance through the testing of four hypotheses. </a:t>
-            </a:r>
-          </a:p>
-          <a:p>
-            <a:r>
-              <a:rPr lang="en-US" sz="2200" dirty="0">
-                <a:solidFill>
-                  <a:schemeClr val="tx1"/>
-                </a:solidFill>
-              </a:rPr>
-              <a:t>Jam slopes replicated for associative judgments, and significant three way interactions were found between the network norms when predicting judgments and recall.</a:t>
-            </a:r>
-          </a:p>
-          <a:p>
-            <a:r>
-              <a:rPr lang="en-US" sz="2200" dirty="0">
-                <a:solidFill>
-                  <a:schemeClr val="tx1"/>
-                </a:solidFill>
-              </a:rPr>
-              <a:t>A “seesaw eﬀect” was found in which increases in thematic strength led to decreases in associative </a:t>
-            </a:r>
-            <a:r>
-              <a:rPr lang="en-US" sz="2200" dirty="0" err="1">
-                <a:solidFill>
-                  <a:schemeClr val="tx1"/>
-                </a:solidFill>
-              </a:rPr>
-              <a:t>predictiveness</a:t>
-            </a:r>
-            <a:r>
-              <a:rPr lang="en-US" sz="2200" dirty="0">
-                <a:solidFill>
-                  <a:schemeClr val="tx1"/>
-                </a:solidFill>
-              </a:rPr>
-              <a:t>, at low semantic overlap, but associative and semantic strength increased together at high semantic overlap. </a:t>
-            </a:r>
-          </a:p>
-          <a:p>
-            <a:endParaRPr lang="en-US" sz="2200" dirty="0">
-              <a:solidFill>
-                <a:schemeClr val="tx1"/>
-              </a:solidFill>
-            </a:endParaRPr>
-          </a:p>
-          <a:p>
-            <a:endParaRPr lang="en-US" dirty="0"/>
-          </a:p>
-        </p:txBody>
-      </p:sp>
-    </p:spTree>
-    <p:extLst>
-      <p:ext uri="{BB962C8B-B14F-4D97-AF65-F5344CB8AC3E}">
-        <p14:creationId xmlns:p14="http://schemas.microsoft.com/office/powerpoint/2010/main" val="3686436610"/>
-      </p:ext>
-    </p:extLst>
-  </p:cSld>
-  <p:clrMapOvr>
-    <a:masterClrMapping/>
-  </p:clrMapOvr>
-</p:sld>
-</file>
-
-<file path=ppt/slides/slide26.xml><?xml version="1.0" encoding="utf-8"?>
-<p:sld xmlns:a="http://schemas.openxmlformats.org/drawingml/2006/main" xmlns:r="http://schemas.openxmlformats.org/officeDocument/2006/relationships" xmlns:p="http://schemas.openxmlformats.org/presentationml/2006/main">
-  <p:cSld>
-    <p:spTree>
-      <p:nvGrpSpPr>
-        <p:cNvPr id="1" name=""/>
-        <p:cNvGrpSpPr/>
-        <p:nvPr/>
-      </p:nvGrpSpPr>
-      <p:grpSpPr>
-        <a:xfrm>
-          <a:off x="0" y="0"/>
-          <a:ext cx="0" cy="0"/>
-          <a:chOff x="0" y="0"/>
-          <a:chExt cx="0" cy="0"/>
-        </a:xfrm>
-      </p:grpSpPr>
-      <p:sp>
-        <p:nvSpPr>
-          <p:cNvPr id="2" name="Title 1">
-            <a:extLst>
-              <a:ext uri="{FF2B5EF4-FFF2-40B4-BE49-F238E27FC236}">
-                <a16:creationId xmlns:a16="http://schemas.microsoft.com/office/drawing/2014/main" id="{6E468579-DB8F-44E2-A6F1-8D6F05B82605}"/>
-              </a:ext>
-            </a:extLst>
-          </p:cNvPr>
-          <p:cNvSpPr>
-            <a:spLocks noGrp="1"/>
-          </p:cNvSpPr>
-          <p:nvPr>
-            <p:ph type="title"/>
-          </p:nvPr>
-        </p:nvSpPr>
-        <p:spPr/>
-        <p:txBody>
-          <a:bodyPr/>
-          <a:lstStyle/>
-          <a:p>
-            <a:r>
-              <a:rPr lang="en-US" dirty="0"/>
-              <a:t>Summary – Experiment Two</a:t>
+              <a:t>Summary – Interaction Replication</a:t>
             </a:r>
           </a:p>
         </p:txBody>
@@ -30647,7 +30463,7 @@
                   <a:schemeClr val="tx1"/>
                 </a:solidFill>
               </a:rPr>
-              <a:t>Experiment Two sought to replicate interaction findings from the first experiment, first when using a novel set of stimuli and then when controlling for single word norms. </a:t>
+              <a:t>This study sought to replicate interaction findings from the pilot study, first when using a novel set of stimuli and then when controlling for single word norms. </a:t>
             </a:r>
           </a:p>
           <a:p>
@@ -30667,7 +30483,7 @@
                   <a:schemeClr val="tx1"/>
                 </a:solidFill>
               </a:rPr>
-              <a:t>A significant three-way interaction was detected between the network norms when predicting recall, although this interaction was in the opposite direction as findings from Experiment One (FSG and LSA strength were complimentary at low levels of semantics and became increasingly competitive at high levels).</a:t>
+              <a:t>A significant three-way interaction was detected between the network norms when predicting recall, although this interaction was in the opposite direction as findings from the pilot study (FSG and LSA strength were complimentary at low levels of semantics and became increasingly competitive at high levels).</a:t>
             </a:r>
           </a:p>
         </p:txBody>
@@ -30685,7 +30501,7 @@
 </p:sld>
 </file>
 
-<file path=ppt/slides/slide27.xml><?xml version="1.0" encoding="utf-8"?>
+<file path=ppt/slides/slide26.xml><?xml version="1.0" encoding="utf-8"?>
 <p:sld xmlns:a="http://schemas.openxmlformats.org/drawingml/2006/main" xmlns:r="http://schemas.openxmlformats.org/officeDocument/2006/relationships" xmlns:p="http://schemas.openxmlformats.org/presentationml/2006/main">
   <p:cSld>
     <p:spTree>
@@ -30730,7 +30546,7 @@
           <a:p>
             <a:r>
               <a:rPr lang="en-US" dirty="0"/>
-              <a:t>Summary – Experiment Two Single Word Norms</a:t>
+              <a:t>Summary – Single Word Norms Analysis</a:t>
             </a:r>
           </a:p>
         </p:txBody>
@@ -30800,7 +30616,7 @@
                   <a:schemeClr val="tx1"/>
                 </a:solidFill>
               </a:rPr>
-              <a:t>When predicting recall, the three-way interaction between network norms was significant, and once again the interaction was in the opposite direction of Experiment One.</a:t>
+              <a:t>When predicting recall, the three-way interaction between network norms was significant, and once again the interaction was in the opposite direction of pilot study.</a:t>
             </a:r>
           </a:p>
         </p:txBody>
@@ -30818,7 +30634,7 @@
 </p:sld>
 </file>
 
-<file path=ppt/slides/slide28.xml><?xml version="1.0" encoding="utf-8"?>
+<file path=ppt/slides/slide27.xml><?xml version="1.0" encoding="utf-8"?>
 <p:sld xmlns:a="http://schemas.openxmlformats.org/drawingml/2006/main" xmlns:r="http://schemas.openxmlformats.org/officeDocument/2006/relationships" xmlns:p="http://schemas.openxmlformats.org/presentationml/2006/main">
   <p:cSld>
     <p:spTree>
@@ -30958,7 +30774,7 @@
 </p:sld>
 </file>
 
-<file path=ppt/slides/slide29.xml><?xml version="1.0" encoding="utf-8"?>
+<file path=ppt/slides/slide28.xml><?xml version="1.0" encoding="utf-8"?>
 <p:sld xmlns:a="http://schemas.openxmlformats.org/drawingml/2006/main" xmlns:r="http://schemas.openxmlformats.org/officeDocument/2006/relationships" xmlns:p="http://schemas.openxmlformats.org/presentationml/2006/main">
   <p:cSld>
     <p:spTree>
@@ -31208,6 +31024,123 @@
 </p:sld>
 </file>
 
+<file path=ppt/slides/slide29.xml><?xml version="1.0" encoding="utf-8"?>
+<p:sld xmlns:a="http://schemas.openxmlformats.org/drawingml/2006/main" xmlns:r="http://schemas.openxmlformats.org/officeDocument/2006/relationships" xmlns:p="http://schemas.openxmlformats.org/presentationml/2006/main">
+  <p:cSld>
+    <p:spTree>
+      <p:nvGrpSpPr>
+        <p:cNvPr id="1" name=""/>
+        <p:cNvGrpSpPr/>
+        <p:nvPr/>
+      </p:nvGrpSpPr>
+      <p:grpSpPr>
+        <a:xfrm>
+          <a:off x="0" y="0"/>
+          <a:ext cx="0" cy="0"/>
+          <a:chOff x="0" y="0"/>
+          <a:chExt cx="0" cy="0"/>
+        </a:xfrm>
+      </p:grpSpPr>
+      <p:sp>
+        <p:nvSpPr>
+          <p:cNvPr id="7" name="Title 6">
+            <a:extLst>
+              <a:ext uri="{FF2B5EF4-FFF2-40B4-BE49-F238E27FC236}">
+                <a16:creationId xmlns:a16="http://schemas.microsoft.com/office/drawing/2014/main" id="{3846CD71-3EBF-400D-BC69-5D45313B6930}"/>
+              </a:ext>
+            </a:extLst>
+          </p:cNvPr>
+          <p:cNvSpPr>
+            <a:spLocks noGrp="1"/>
+          </p:cNvSpPr>
+          <p:nvPr>
+            <p:ph type="title"/>
+          </p:nvPr>
+        </p:nvSpPr>
+        <p:spPr/>
+        <p:txBody>
+          <a:bodyPr/>
+          <a:lstStyle/>
+          <a:p>
+            <a:r>
+              <a:rPr lang="en-US" dirty="0"/>
+              <a:t>General Discussion</a:t>
+            </a:r>
+          </a:p>
+        </p:txBody>
+      </p:sp>
+      <p:sp>
+        <p:nvSpPr>
+          <p:cNvPr id="8" name="Content Placeholder 7">
+            <a:extLst>
+              <a:ext uri="{FF2B5EF4-FFF2-40B4-BE49-F238E27FC236}">
+                <a16:creationId xmlns:a16="http://schemas.microsoft.com/office/drawing/2014/main" id="{3C5DA883-CEC7-47BE-A0EF-801F5D36B583}"/>
+              </a:ext>
+            </a:extLst>
+          </p:cNvPr>
+          <p:cNvSpPr>
+            <a:spLocks noGrp="1"/>
+          </p:cNvSpPr>
+          <p:nvPr>
+            <p:ph idx="1"/>
+          </p:nvPr>
+        </p:nvSpPr>
+        <p:spPr>
+          <a:xfrm>
+            <a:off x="1154954" y="2603500"/>
+            <a:ext cx="9657826" cy="3911600"/>
+          </a:xfrm>
+        </p:spPr>
+        <p:txBody>
+          <a:bodyPr>
+            <a:normAutofit/>
+          </a:bodyPr>
+          <a:lstStyle/>
+          <a:p>
+            <a:r>
+              <a:rPr lang="en-US" sz="2200" dirty="0">
+                <a:solidFill>
+                  <a:schemeClr val="tx1"/>
+                </a:solidFill>
+              </a:rPr>
+              <a:t>In several instances, cue and target slopes appeared to balance out another in both judgment and recall models. (i.e., cue slope was positive, but target slope was negative)</a:t>
+            </a:r>
+          </a:p>
+          <a:p>
+            <a:r>
+              <a:rPr lang="en-US" sz="2200" dirty="0">
+                <a:solidFill>
+                  <a:schemeClr val="tx1"/>
+                </a:solidFill>
+              </a:rPr>
+              <a:t>The bi-directional pathways in the triangle model may explain this trend of cue and target slopes balancing out one another.</a:t>
+            </a:r>
+          </a:p>
+          <a:p>
+            <a:r>
+              <a:rPr lang="en-US" sz="2200" dirty="0">
+                <a:solidFill>
+                  <a:schemeClr val="tx1"/>
+                </a:solidFill>
+              </a:rPr>
+              <a:t>Each item appears to be individually weighted, which could indicate that the focus of attention was spread across cue and target and these were weighted evenly. </a:t>
+            </a:r>
+          </a:p>
+        </p:txBody>
+      </p:sp>
+    </p:spTree>
+    <p:extLst>
+      <p:ext uri="{BB962C8B-B14F-4D97-AF65-F5344CB8AC3E}">
+        <p14:creationId xmlns:p14="http://schemas.microsoft.com/office/powerpoint/2010/main" val="2493301455"/>
+      </p:ext>
+    </p:extLst>
+  </p:cSld>
+  <p:clrMapOvr>
+    <a:masterClrMapping/>
+  </p:clrMapOvr>
+</p:sld>
+</file>
+
 <file path=ppt/slides/slide3.xml><?xml version="1.0" encoding="utf-8"?>
 <p:sld xmlns:a="http://schemas.openxmlformats.org/drawingml/2006/main" xmlns:r="http://schemas.openxmlformats.org/officeDocument/2006/relationships" xmlns:p="http://schemas.openxmlformats.org/presentationml/2006/main">
   <p:cSld>
@@ -31350,123 +31283,6 @@
       </p:grpSpPr>
       <p:sp>
         <p:nvSpPr>
-          <p:cNvPr id="7" name="Title 6">
-            <a:extLst>
-              <a:ext uri="{FF2B5EF4-FFF2-40B4-BE49-F238E27FC236}">
-                <a16:creationId xmlns:a16="http://schemas.microsoft.com/office/drawing/2014/main" id="{3846CD71-3EBF-400D-BC69-5D45313B6930}"/>
-              </a:ext>
-            </a:extLst>
-          </p:cNvPr>
-          <p:cNvSpPr>
-            <a:spLocks noGrp="1"/>
-          </p:cNvSpPr>
-          <p:nvPr>
-            <p:ph type="title"/>
-          </p:nvPr>
-        </p:nvSpPr>
-        <p:spPr/>
-        <p:txBody>
-          <a:bodyPr/>
-          <a:lstStyle/>
-          <a:p>
-            <a:r>
-              <a:rPr lang="en-US" dirty="0"/>
-              <a:t>General Discussion</a:t>
-            </a:r>
-          </a:p>
-        </p:txBody>
-      </p:sp>
-      <p:sp>
-        <p:nvSpPr>
-          <p:cNvPr id="8" name="Content Placeholder 7">
-            <a:extLst>
-              <a:ext uri="{FF2B5EF4-FFF2-40B4-BE49-F238E27FC236}">
-                <a16:creationId xmlns:a16="http://schemas.microsoft.com/office/drawing/2014/main" id="{3C5DA883-CEC7-47BE-A0EF-801F5D36B583}"/>
-              </a:ext>
-            </a:extLst>
-          </p:cNvPr>
-          <p:cNvSpPr>
-            <a:spLocks noGrp="1"/>
-          </p:cNvSpPr>
-          <p:nvPr>
-            <p:ph idx="1"/>
-          </p:nvPr>
-        </p:nvSpPr>
-        <p:spPr>
-          <a:xfrm>
-            <a:off x="1154954" y="2603500"/>
-            <a:ext cx="9657826" cy="3911600"/>
-          </a:xfrm>
-        </p:spPr>
-        <p:txBody>
-          <a:bodyPr>
-            <a:normAutofit/>
-          </a:bodyPr>
-          <a:lstStyle/>
-          <a:p>
-            <a:r>
-              <a:rPr lang="en-US" sz="2200" dirty="0">
-                <a:solidFill>
-                  <a:schemeClr val="tx1"/>
-                </a:solidFill>
-              </a:rPr>
-              <a:t>In several instances, cue and target slopes appeared to balance out another in both judgment and recall models. (i.e., cue slope was positive, but target slope was negative)</a:t>
-            </a:r>
-          </a:p>
-          <a:p>
-            <a:r>
-              <a:rPr lang="en-US" sz="2200" dirty="0">
-                <a:solidFill>
-                  <a:schemeClr val="tx1"/>
-                </a:solidFill>
-              </a:rPr>
-              <a:t>The bi-directional pathways in the triangle model may explain this trend of cue and target slopes balancing out one another.</a:t>
-            </a:r>
-          </a:p>
-          <a:p>
-            <a:r>
-              <a:rPr lang="en-US" sz="2200" dirty="0">
-                <a:solidFill>
-                  <a:schemeClr val="tx1"/>
-                </a:solidFill>
-              </a:rPr>
-              <a:t>Each item appears to be individually weighted, which could indicate that the focus of attention was spread across cue and target and these were weighted evenly. </a:t>
-            </a:r>
-          </a:p>
-        </p:txBody>
-      </p:sp>
-    </p:spTree>
-    <p:extLst>
-      <p:ext uri="{BB962C8B-B14F-4D97-AF65-F5344CB8AC3E}">
-        <p14:creationId xmlns:p14="http://schemas.microsoft.com/office/powerpoint/2010/main" val="2493301455"/>
-      </p:ext>
-    </p:extLst>
-  </p:cSld>
-  <p:clrMapOvr>
-    <a:masterClrMapping/>
-  </p:clrMapOvr>
-</p:sld>
-</file>
-
-<file path=ppt/slides/slide31.xml><?xml version="1.0" encoding="utf-8"?>
-<p:sld xmlns:a="http://schemas.openxmlformats.org/drawingml/2006/main" xmlns:r="http://schemas.openxmlformats.org/officeDocument/2006/relationships" xmlns:p="http://schemas.openxmlformats.org/presentationml/2006/main">
-  <p:cSld>
-    <p:spTree>
-      <p:nvGrpSpPr>
-        <p:cNvPr id="1" name=""/>
-        <p:cNvGrpSpPr/>
-        <p:nvPr/>
-      </p:nvGrpSpPr>
-      <p:grpSpPr>
-        <a:xfrm>
-          <a:off x="0" y="0"/>
-          <a:ext cx="0" cy="0"/>
-          <a:chOff x="0" y="0"/>
-          <a:chExt cx="0" cy="0"/>
-        </a:xfrm>
-      </p:grpSpPr>
-      <p:sp>
-        <p:nvSpPr>
           <p:cNvPr id="2" name="Title 1">
             <a:extLst>
               <a:ext uri="{FF2B5EF4-FFF2-40B4-BE49-F238E27FC236}">
@@ -31550,7 +31366,7 @@
 </p:sld>
 </file>
 
-<file path=ppt/slides/slide32.xml><?xml version="1.0" encoding="utf-8"?>
+<file path=ppt/slides/slide31.xml><?xml version="1.0" encoding="utf-8"?>
 <p:sld xmlns:a="http://schemas.openxmlformats.org/drawingml/2006/main" xmlns:r="http://schemas.openxmlformats.org/officeDocument/2006/relationships" xmlns:p="http://schemas.openxmlformats.org/presentationml/2006/main">
   <p:cSld>
     <p:spTree>
@@ -31634,7 +31450,7 @@
                   <a:schemeClr val="tx1"/>
                 </a:solidFill>
               </a:rPr>
-              <a:t>To help control for this, single word norms were gathered for the stimuli set used in Experiment One. Data was then combined across experiments. This led to several NA values across each single word norm, as some of the cue and target items were used in Experiment One were missing from various databases.</a:t>
+              <a:t>To help control for this, single word norms were gathered for the stimuli set used in the pilot study. Data was then combined across experiments. This led to several NA values across each single word norm, as some of the cue and target items were used in the pilot were missing from various databases.</a:t>
             </a:r>
           </a:p>
         </p:txBody>
@@ -31652,7 +31468,7 @@
 </p:sld>
 </file>
 
-<file path=ppt/slides/slide33.xml><?xml version="1.0" encoding="utf-8"?>
+<file path=ppt/slides/slide32.xml><?xml version="1.0" encoding="utf-8"?>
 <p:sld xmlns:a="http://schemas.openxmlformats.org/drawingml/2006/main" xmlns:r="http://schemas.openxmlformats.org/officeDocument/2006/relationships" xmlns:p="http://schemas.openxmlformats.org/presentationml/2006/main">
   <p:cSld>
     <p:spTree>
@@ -32685,7 +32501,7 @@
                   <a:schemeClr val="tx1"/>
                 </a:solidFill>
               </a:rPr>
-              <a:t>63 new word pairs created from the same database</a:t>
+              <a:t>Like in the pilot study, 63 word pairs created from the Buchanan et al. 2013 word norms.</a:t>
             </a:r>
           </a:p>
           <a:p>

</xml_diff>